<commit_message>
Modified   documentation/Java training 28- Servelt API- Jsp.pptx
</commit_message>
<xml_diff>
--- a/documentation/Java training 28- Servelt API- Jsp.pptx
+++ b/documentation/Java training 28- Servelt API- Jsp.pptx
@@ -3305,18 +3305,33 @@
               <a:rPr lang="hu-HU" dirty="0" err="1" smtClean="0"/>
               <a:t>Tutorial</a:t>
             </a:r>
-            <a:endParaRPr lang="hu-HU" smtClean="0"/>
+            <a:endParaRPr lang="hu-HU" dirty="0" smtClean="0"/>
           </a:p>
           <a:p>
             <a:pPr lvl="1"/>
             <a:r>
-              <a:rPr lang="hu-HU" dirty="0" smtClean="0"/>
+              <a:rPr lang="hu-HU" dirty="0" smtClean="0">
+                <a:hlinkClick r:id="rId2"/>
+              </a:rPr>
               <a:t>http</a:t>
             </a:r>
             <a:r>
-              <a:rPr lang="hu-HU" dirty="0"/>
-              <a:t>://www.tutorialspoint.com/jsp/</a:t>
-            </a:r>
+              <a:rPr lang="hu-HU" dirty="0">
+                <a:hlinkClick r:id="rId2"/>
+              </a:rPr>
+              <a:t>://www.tutorialspoint.com/jsp</a:t>
+            </a:r>
+            <a:r>
+              <a:rPr lang="hu-HU" dirty="0" smtClean="0">
+                <a:hlinkClick r:id="rId2"/>
+              </a:rPr>
+              <a:t>/</a:t>
+            </a:r>
+            <a:endParaRPr lang="hu-HU" dirty="0" smtClean="0"/>
+          </a:p>
+          <a:p>
+            <a:pPr lvl="1"/>
+            <a:endParaRPr lang="hu-HU" dirty="0"/>
           </a:p>
         </p:txBody>
       </p:sp>

</xml_diff>